<commit_message>
Initial commit: working Agentic AI PPT generator
</commit_message>
<xml_diff>
--- a/outputs/output_deck.pptx
+++ b/outputs/output_deck.pptx
@@ -3114,7 +3114,7 @@
                   <a:srgbClr val="0066CC"/>
                 </a:solidFill>
               </a:rPr>
-              <a:t>Aphelios Overview</a:t>
+              <a:t>Akali Overview</a:t>
             </a:r>
           </a:p>
         </p:txBody>
@@ -3135,19 +3135,19 @@
           <a:lstStyle/>
           <a:p>
             <a:r>
-              <a:t>Marksman champion in League of Legends</a:t>
+              <a:t>Ninja Assassin Champion</a:t>
             </a:r>
           </a:p>
           <a:p>
             <a:pPr/>
             <a:r>
-              <a:t>Unique weapon system with five different weapons</a:t>
+              <a:t>Part of the Ionian faction</a:t>
             </a:r>
           </a:p>
           <a:p>
             <a:pPr/>
             <a:r>
-              <a:t>No traditional mana or energy resource</a:t>
+              <a:t>High mobility and burst damage</a:t>
             </a:r>
           </a:p>
         </p:txBody>
@@ -3191,7 +3191,7 @@
                   <a:srgbClr val="0066CC"/>
                 </a:solidFill>
               </a:rPr>
-              <a:t>Weapon Mechanics</a:t>
+              <a:t>Abilities Breakdown</a:t>
             </a:r>
           </a:p>
         </p:txBody>
@@ -3212,19 +3212,25 @@
           <a:lstStyle/>
           <a:p>
             <a:r>
-              <a:t>Each weapon has distinct abilities</a:t>
+              <a:t>Q: Five Point Strike - Damage and Energy restoration</a:t>
             </a:r>
           </a:p>
           <a:p>
             <a:pPr/>
             <a:r>
-              <a:t>Switch weapons based on situation</a:t>
+              <a:t>W: Twilight Shroud - Stealth and movement speed</a:t>
             </a:r>
           </a:p>
           <a:p>
             <a:pPr/>
             <a:r>
-              <a:t>Weapon cooldowns affect gameplay</a:t>
+              <a:t>E: Shuriken Flip - Mobility and damage</a:t>
+            </a:r>
+          </a:p>
+          <a:p>
+            <a:pPr/>
+            <a:r>
+              <a:t>R: Perfect Execution - Execute enemies</a:t>
             </a:r>
           </a:p>
         </p:txBody>
@@ -3268,7 +3274,7 @@
                   <a:srgbClr val="0066CC"/>
                 </a:solidFill>
               </a:rPr>
-              <a:t>Playstyle</a:t>
+              <a:t>Role in Gameplay</a:t>
             </a:r>
           </a:p>
         </p:txBody>
@@ -3289,19 +3295,19 @@
           <a:lstStyle/>
           <a:p>
             <a:r>
-              <a:t>Requires strategic positioning</a:t>
+              <a:t>Primarily played in mid lane</a:t>
             </a:r>
           </a:p>
           <a:p>
             <a:pPr/>
             <a:r>
-              <a:t>Adapt to enemy team composition</a:t>
+              <a:t>Can be played as an assassin or burst mage</a:t>
             </a:r>
           </a:p>
           <a:p>
             <a:pPr/>
             <a:r>
-              <a:t>High skill ceiling and complexity</a:t>
+              <a:t>Strong duelist with high outplay potential</a:t>
             </a:r>
           </a:p>
         </p:txBody>
@@ -3345,7 +3351,7 @@
                   <a:srgbClr val="0066CC"/>
                 </a:solidFill>
               </a:rPr>
-              <a:t>Strengths and Weaknesses</a:t>
+              <a:t>Tips for Playing Akali</a:t>
             </a:r>
           </a:p>
         </p:txBody>
@@ -3366,19 +3372,19 @@
           <a:lstStyle/>
           <a:p>
             <a:r>
-              <a:t>Strong burst damage with certain weapons</a:t>
+              <a:t>Utilize stealth for surprise attacks</a:t>
             </a:r>
           </a:p>
           <a:p>
             <a:pPr/>
             <a:r>
-              <a:t>Vulnerable to crowd control</a:t>
+              <a:t>Farm efficiently with Q for energy</a:t>
             </a:r>
           </a:p>
           <a:p>
             <a:pPr/>
             <a:r>
-              <a:t>Requires practice to master</a:t>
+              <a:t>Positioning is key during team fights</a:t>
             </a:r>
           </a:p>
         </p:txBody>
@@ -3422,7 +3428,7 @@
                   <a:srgbClr val="0066CC"/>
                 </a:solidFill>
               </a:rPr>
-              <a:t>Competitive Viability</a:t>
+              <a:t>Countering Akali</a:t>
             </a:r>
           </a:p>
         </p:txBody>
@@ -3443,19 +3449,19 @@
           <a:lstStyle/>
           <a:p>
             <a:r>
-              <a:t>Popular in professional play</a:t>
+              <a:t>Use crowd control to lock her down</a:t>
             </a:r>
           </a:p>
           <a:p>
             <a:pPr/>
             <a:r>
-              <a:t>Synergizes well with certain supports</a:t>
+              <a:t>Pick champions with strong burst damage</a:t>
             </a:r>
           </a:p>
           <a:p>
             <a:pPr/>
             <a:r>
-              <a:t>Can carry games with proper execution</a:t>
+              <a:t>Warding is crucial to avoid her ambush</a:t>
             </a:r>
           </a:p>
         </p:txBody>
@@ -3478,30 +3484,65 @@
         <p:nvPr/>
       </p:nvGrpSpPr>
       <p:grpSpPr/>
-      <p:pic>
-        <p:nvPicPr>
-          <p:cNvPr id="2" name="Picture 1" descr="slide_image.png"/>
-          <p:cNvPicPr>
-            <a:picLocks noChangeAspect="1"/>
-          </p:cNvPicPr>
-          <p:nvPr/>
-        </p:nvPicPr>
-        <p:blipFill>
-          <a:blip r:embed="rId2"/>
-          <a:stretch>
-            <a:fillRect/>
-          </a:stretch>
-        </p:blipFill>
-        <p:spPr>
-          <a:xfrm>
-            <a:off x="914400" y="914400"/>
-            <a:ext cx="7315200" cy="4316871"/>
-          </a:xfrm>
-          <a:prstGeom prst="rect">
-            <a:avLst/>
-          </a:prstGeom>
-        </p:spPr>
-      </p:pic>
+      <p:sp>
+        <p:nvSpPr>
+          <p:cNvPr id="2" name="Title 1"/>
+          <p:cNvSpPr>
+            <a:spLocks noGrp="1"/>
+          </p:cNvSpPr>
+          <p:nvPr>
+            <p:ph type="title"/>
+          </p:nvPr>
+        </p:nvSpPr>
+        <p:spPr/>
+        <p:txBody>
+          <a:bodyPr/>
+          <a:lstStyle/>
+          <a:p>
+            <a:r>
+              <a:rPr b="1" sz="4000">
+                <a:solidFill>
+                  <a:srgbClr val="0066CC"/>
+                </a:solidFill>
+              </a:rPr>
+              <a:t>Recent Changes</a:t>
+            </a:r>
+          </a:p>
+        </p:txBody>
+      </p:sp>
+      <p:sp>
+        <p:nvSpPr>
+          <p:cNvPr id="3" name="Content Placeholder 2"/>
+          <p:cNvSpPr>
+            <a:spLocks noGrp="1"/>
+          </p:cNvSpPr>
+          <p:nvPr>
+            <p:ph idx="1"/>
+          </p:nvPr>
+        </p:nvSpPr>
+        <p:spPr/>
+        <p:txBody>
+          <a:bodyPr/>
+          <a:lstStyle/>
+          <a:p>
+            <a:r>
+              <a:t>Updates to ability scaling</a:t>
+            </a:r>
+          </a:p>
+          <a:p>
+            <a:pPr/>
+            <a:r>
+              <a:t>Balance adjustments in recent patches</a:t>
+            </a:r>
+          </a:p>
+          <a:p>
+            <a:pPr/>
+            <a:r>
+              <a:t>Increased viability in competitive play</a:t>
+            </a:r>
+          </a:p>
+        </p:txBody>
+      </p:sp>
     </p:spTree>
   </p:cSld>
   <p:clrMapOvr>

</xml_diff>